<commit_message>
DG: oauth2 added code snippet
</commit_message>
<xml_diff>
--- a/docs/diagrams/OAuth2ClassDiagram.pptx
+++ b/docs/diagrams/OAuth2ClassDiagram.pptx
@@ -104,6 +104,11 @@
       </a:defRPr>
     </a:lvl9pPr>
   </p:defaultTextStyle>
+  <p:extLst>
+    <p:ext uri="{EFAFB233-063F-42B5-8137-9DF3F51BA10A}">
+      <p15:sldGuideLst xmlns:p15="http://schemas.microsoft.com/office/powerpoint/2012/main"/>
+    </p:ext>
+  </p:extLst>
 </p:presentation>
 </file>
 
@@ -260,7 +265,7 @@
           <a:p>
             <a:fld id="{C7687EC4-D9BF-4E10-B3DF-0AD18242A045}" type="datetimeFigureOut">
               <a:rPr lang="en-SG" smtClean="0"/>
-              <a:t>24/10/2017</a:t>
+              <a:t>8/11/2017</a:t>
             </a:fld>
             <a:endParaRPr lang="en-SG"/>
           </a:p>
@@ -460,7 +465,7 @@
           <a:p>
             <a:fld id="{C7687EC4-D9BF-4E10-B3DF-0AD18242A045}" type="datetimeFigureOut">
               <a:rPr lang="en-SG" smtClean="0"/>
-              <a:t>24/10/2017</a:t>
+              <a:t>8/11/2017</a:t>
             </a:fld>
             <a:endParaRPr lang="en-SG"/>
           </a:p>
@@ -670,7 +675,7 @@
           <a:p>
             <a:fld id="{C7687EC4-D9BF-4E10-B3DF-0AD18242A045}" type="datetimeFigureOut">
               <a:rPr lang="en-SG" smtClean="0"/>
-              <a:t>24/10/2017</a:t>
+              <a:t>8/11/2017</a:t>
             </a:fld>
             <a:endParaRPr lang="en-SG"/>
           </a:p>
@@ -870,7 +875,7 @@
           <a:p>
             <a:fld id="{C7687EC4-D9BF-4E10-B3DF-0AD18242A045}" type="datetimeFigureOut">
               <a:rPr lang="en-SG" smtClean="0"/>
-              <a:t>24/10/2017</a:t>
+              <a:t>8/11/2017</a:t>
             </a:fld>
             <a:endParaRPr lang="en-SG"/>
           </a:p>
@@ -1146,7 +1151,7 @@
           <a:p>
             <a:fld id="{C7687EC4-D9BF-4E10-B3DF-0AD18242A045}" type="datetimeFigureOut">
               <a:rPr lang="en-SG" smtClean="0"/>
-              <a:t>24/10/2017</a:t>
+              <a:t>8/11/2017</a:t>
             </a:fld>
             <a:endParaRPr lang="en-SG"/>
           </a:p>
@@ -1414,7 +1419,7 @@
           <a:p>
             <a:fld id="{C7687EC4-D9BF-4E10-B3DF-0AD18242A045}" type="datetimeFigureOut">
               <a:rPr lang="en-SG" smtClean="0"/>
-              <a:t>24/10/2017</a:t>
+              <a:t>8/11/2017</a:t>
             </a:fld>
             <a:endParaRPr lang="en-SG"/>
           </a:p>
@@ -1829,7 +1834,7 @@
           <a:p>
             <a:fld id="{C7687EC4-D9BF-4E10-B3DF-0AD18242A045}" type="datetimeFigureOut">
               <a:rPr lang="en-SG" smtClean="0"/>
-              <a:t>24/10/2017</a:t>
+              <a:t>8/11/2017</a:t>
             </a:fld>
             <a:endParaRPr lang="en-SG"/>
           </a:p>
@@ -1971,7 +1976,7 @@
           <a:p>
             <a:fld id="{C7687EC4-D9BF-4E10-B3DF-0AD18242A045}" type="datetimeFigureOut">
               <a:rPr lang="en-SG" smtClean="0"/>
-              <a:t>24/10/2017</a:t>
+              <a:t>8/11/2017</a:t>
             </a:fld>
             <a:endParaRPr lang="en-SG"/>
           </a:p>
@@ -2084,7 +2089,7 @@
           <a:p>
             <a:fld id="{C7687EC4-D9BF-4E10-B3DF-0AD18242A045}" type="datetimeFigureOut">
               <a:rPr lang="en-SG" smtClean="0"/>
-              <a:t>24/10/2017</a:t>
+              <a:t>8/11/2017</a:t>
             </a:fld>
             <a:endParaRPr lang="en-SG"/>
           </a:p>
@@ -2397,7 +2402,7 @@
           <a:p>
             <a:fld id="{C7687EC4-D9BF-4E10-B3DF-0AD18242A045}" type="datetimeFigureOut">
               <a:rPr lang="en-SG" smtClean="0"/>
-              <a:t>24/10/2017</a:t>
+              <a:t>8/11/2017</a:t>
             </a:fld>
             <a:endParaRPr lang="en-SG"/>
           </a:p>
@@ -2686,7 +2691,7 @@
           <a:p>
             <a:fld id="{C7687EC4-D9BF-4E10-B3DF-0AD18242A045}" type="datetimeFigureOut">
               <a:rPr lang="en-SG" smtClean="0"/>
-              <a:t>24/10/2017</a:t>
+              <a:t>8/11/2017</a:t>
             </a:fld>
             <a:endParaRPr lang="en-SG"/>
           </a:p>
@@ -2929,7 +2934,7 @@
           <a:p>
             <a:fld id="{C7687EC4-D9BF-4E10-B3DF-0AD18242A045}" type="datetimeFigureOut">
               <a:rPr lang="en-SG" smtClean="0"/>
-              <a:t>24/10/2017</a:t>
+              <a:t>8/11/2017</a:t>
             </a:fld>
             <a:endParaRPr lang="en-SG"/>
           </a:p>
@@ -3360,8 +3365,8 @@
         </p:nvSpPr>
         <p:spPr>
           <a:xfrm>
-            <a:off x="641657" y="816119"/>
-            <a:ext cx="4898315" cy="1785104"/>
+            <a:off x="523017" y="264391"/>
+            <a:ext cx="4971801" cy="2523768"/>
           </a:xfrm>
           <a:prstGeom prst="rect">
             <a:avLst/>
@@ -3386,7 +3391,7 @@
           <a:p>
             <a:pPr algn="ctr"/>
             <a:r>
-              <a:rPr lang="en-SG" sz="1000">
+              <a:rPr lang="en-SG" sz="1200">
                 <a:solidFill>
                   <a:srgbClr val="FF0000"/>
                 </a:solidFill>
@@ -3394,160 +3399,160 @@
               <a:t>      {abstract}</a:t>
             </a:r>
             <a:r>
-              <a:rPr lang="en-SG" sz="1000"/>
+              <a:rPr lang="en-SG" sz="1200"/>
               <a:t>	</a:t>
             </a:r>
           </a:p>
           <a:p>
             <a:pPr algn="ctr"/>
             <a:r>
-              <a:rPr lang="en-SG" sz="1000" b="1"/>
+              <a:rPr lang="en-SG" sz="1400" b="1"/>
               <a:t>Oauth2Command</a:t>
             </a:r>
           </a:p>
           <a:p>
             <a:pPr algn="ctr"/>
-            <a:endParaRPr lang="en-SG" sz="1000" b="1"/>
-          </a:p>
-          <a:p>
-            <a:r>
-              <a:rPr lang="en-SG" sz="1000" b="1"/>
+            <a:endParaRPr lang="en-SG" sz="1200" b="1"/>
+          </a:p>
+          <a:p>
+            <a:r>
+              <a:rPr lang="en-SG" sz="1200" b="1"/>
               <a:t>+</a:t>
             </a:r>
             <a:r>
-              <a:rPr lang="en-SG" sz="1000"/>
+              <a:rPr lang="en-SG" sz="1200"/>
               <a:t> </a:t>
             </a:r>
             <a:r>
-              <a:rPr lang="en-SG" sz="1000" b="1"/>
+              <a:rPr lang="en-SG" sz="1200" b="1"/>
               <a:t>INVALID_COMMAND_TYPE_MESSAGE</a:t>
             </a:r>
             <a:r>
-              <a:rPr lang="en-SG" sz="1000"/>
+              <a:rPr lang="en-SG" sz="1200"/>
               <a:t>: String = "The COMMAND_TYPE cannot be null“</a:t>
             </a:r>
           </a:p>
           <a:p>
             <a:r>
-              <a:rPr lang="en-SG" sz="1000" b="1"/>
+              <a:rPr lang="en-SG" sz="1200" b="1"/>
               <a:t>- REDIRECT_URL</a:t>
             </a:r>
             <a:r>
-              <a:rPr lang="en-SG" sz="1000"/>
+              <a:rPr lang="en-SG" sz="1200"/>
               <a:t>: String  = “https://cs2103tdummyendpoint.herokuapp.com”</a:t>
             </a:r>
           </a:p>
           <a:p>
             <a:r>
-              <a:rPr lang="en-SG" sz="1000" b="1"/>
+              <a:rPr lang="en-SG" sz="1200" b="1"/>
               <a:t>#</a:t>
             </a:r>
             <a:r>
-              <a:rPr lang="en-SG" sz="1000"/>
+              <a:rPr lang="en-SG" sz="1200"/>
               <a:t> </a:t>
             </a:r>
             <a:r>
-              <a:rPr lang="en-SG" sz="1000" b="1"/>
+              <a:rPr lang="en-SG" sz="1200" b="1"/>
               <a:t>commandType</a:t>
             </a:r>
             <a:r>
-              <a:rPr lang="en-SG" sz="1000"/>
+              <a:rPr lang="en-SG" sz="1200"/>
               <a:t>: String</a:t>
             </a:r>
           </a:p>
           <a:p>
-            <a:endParaRPr lang="en-SG" sz="1000"/>
-          </a:p>
-          <a:p>
-            <a:r>
-              <a:rPr lang="en-SG" sz="1000" b="1"/>
+            <a:endParaRPr lang="en-SG" sz="1200"/>
+          </a:p>
+          <a:p>
+            <a:r>
+              <a:rPr lang="en-SG" sz="1200" b="1"/>
               <a:t>+</a:t>
             </a:r>
             <a:r>
-              <a:rPr lang="en-SG" sz="1000"/>
+              <a:rPr lang="en-SG" sz="1200"/>
               <a:t> </a:t>
             </a:r>
             <a:r>
-              <a:rPr lang="en-SG" sz="1000" b="1"/>
+              <a:rPr lang="en-SG" sz="1200" b="1"/>
               <a:t>getRedirectUrl()</a:t>
             </a:r>
             <a:r>
-              <a:rPr lang="en-SG" sz="1000"/>
+              <a:rPr lang="en-SG" sz="1200"/>
               <a:t>: String</a:t>
             </a:r>
           </a:p>
           <a:p>
             <a:r>
-              <a:rPr lang="en-SG" sz="1000" b="1"/>
+              <a:rPr lang="en-SG" sz="1200" b="1"/>
               <a:t>+</a:t>
             </a:r>
             <a:r>
-              <a:rPr lang="en-SG" sz="1000"/>
+              <a:rPr lang="en-SG" sz="1200"/>
               <a:t> </a:t>
             </a:r>
             <a:r>
-              <a:rPr lang="en-SG" sz="1000" b="1"/>
+              <a:rPr lang="en-SG" sz="1200" b="1"/>
               <a:t>getAuthenticationUrl()</a:t>
             </a:r>
             <a:r>
-              <a:rPr lang="en-SG" sz="1000"/>
+              <a:rPr lang="en-SG" sz="1200"/>
               <a:t>: String </a:t>
             </a:r>
             <a:r>
-              <a:rPr lang="en-SG" sz="1000">
+              <a:rPr lang="en-SG" sz="1200">
                 <a:solidFill>
                   <a:srgbClr val="FF0000"/>
                 </a:solidFill>
               </a:rPr>
               <a:t>{abstract}</a:t>
             </a:r>
-            <a:endParaRPr lang="en-SG" sz="1000"/>
-          </a:p>
-          <a:p>
-            <a:r>
-              <a:rPr lang="en-SG" sz="1000" b="1"/>
+            <a:endParaRPr lang="en-SG" sz="1200"/>
+          </a:p>
+          <a:p>
+            <a:r>
+              <a:rPr lang="en-SG" sz="1200" b="1"/>
               <a:t>#</a:t>
             </a:r>
             <a:r>
-              <a:rPr lang="en-SG" sz="1000"/>
+              <a:rPr lang="en-SG" sz="1200"/>
               <a:t> </a:t>
             </a:r>
             <a:r>
-              <a:rPr lang="en-SG" sz="1000" b="1"/>
+              <a:rPr lang="en-SG" sz="1200" b="1"/>
               <a:t>triggerBrowserAuth()</a:t>
             </a:r>
             <a:r>
-              <a:rPr lang="en-SG" sz="1000"/>
+              <a:rPr lang="en-SG" sz="1200"/>
               <a:t>: void</a:t>
             </a:r>
           </a:p>
           <a:p>
             <a:r>
-              <a:rPr lang="en-SG" sz="1000" b="1"/>
+              <a:rPr lang="en-SG" sz="1200" b="1"/>
               <a:t>#</a:t>
             </a:r>
             <a:r>
-              <a:rPr lang="en-SG" sz="1000"/>
+              <a:rPr lang="en-SG" sz="1200"/>
               <a:t> </a:t>
             </a:r>
             <a:r>
-              <a:rPr lang="en-SG" sz="1000" b="1"/>
+              <a:rPr lang="en-SG" sz="1200" b="1"/>
               <a:t>handleAuthenticationSuccessEvent(</a:t>
             </a:r>
             <a:r>
-              <a:rPr lang="en-SG" sz="1000"/>
+              <a:rPr lang="en-SG" sz="1200"/>
               <a:t>GoogleAuthenticationSuccessEvent</a:t>
             </a:r>
             <a:r>
-              <a:rPr lang="en-SG" sz="1000" b="1"/>
+              <a:rPr lang="en-SG" sz="1200" b="1"/>
               <a:t>)</a:t>
             </a:r>
             <a:r>
-              <a:rPr lang="en-SG" sz="1000"/>
+              <a:rPr lang="en-SG" sz="1200"/>
               <a:t>: void </a:t>
             </a:r>
             <a:r>
-              <a:rPr lang="en-SG" sz="1000">
+              <a:rPr lang="en-SG" sz="1200">
                 <a:solidFill>
                   <a:srgbClr val="FF0000"/>
                 </a:solidFill>
@@ -3571,7 +3576,7 @@
         </p:nvSpPr>
         <p:spPr>
           <a:xfrm rot="16200000">
-            <a:off x="5506654" y="1605799"/>
+            <a:off x="5456385" y="1391840"/>
             <a:ext cx="215830" cy="149193"/>
           </a:xfrm>
           <a:prstGeom prst="triangle">
@@ -3607,7 +3612,7 @@
           <a:lstStyle/>
           <a:p>
             <a:pPr algn="ctr"/>
-            <a:endParaRPr lang="en-SG"/>
+            <a:endParaRPr lang="en-SG" sz="2800"/>
           </a:p>
         </p:txBody>
       </p:sp>
@@ -3625,8 +3630,8 @@
         </p:nvSpPr>
         <p:spPr>
           <a:xfrm>
-            <a:off x="5965561" y="710900"/>
-            <a:ext cx="5705233" cy="1938992"/>
+            <a:off x="6029088" y="204553"/>
+            <a:ext cx="5705233" cy="2523768"/>
           </a:xfrm>
           <a:prstGeom prst="rect">
             <a:avLst/>
@@ -3651,7 +3656,7 @@
           <a:p>
             <a:pPr algn="ctr"/>
             <a:r>
-              <a:rPr lang="en-SG" sz="1000">
+              <a:rPr lang="en-SG" sz="1200">
                 <a:solidFill>
                   <a:srgbClr val="FF0000"/>
                 </a:solidFill>
@@ -3659,172 +3664,172 @@
               <a:t>      {abstract}</a:t>
             </a:r>
             <a:r>
-              <a:rPr lang="en-SG" sz="1000"/>
+              <a:rPr lang="en-SG" sz="1200"/>
               <a:t>	</a:t>
             </a:r>
           </a:p>
           <a:p>
             <a:pPr algn="ctr"/>
             <a:r>
-              <a:rPr lang="en-SG" sz="1000" b="1"/>
+              <a:rPr lang="en-SG" sz="1400" b="1"/>
               <a:t>GoogleCommand</a:t>
             </a:r>
           </a:p>
           <a:p>
             <a:pPr algn="ctr"/>
-            <a:endParaRPr lang="en-SG" sz="1000" b="1"/>
-          </a:p>
-          <a:p>
-            <a:r>
-              <a:rPr lang="en-SG" sz="1000" b="1"/>
+            <a:endParaRPr lang="en-SG" sz="1200" b="1"/>
+          </a:p>
+          <a:p>
+            <a:r>
+              <a:rPr lang="en-SG" sz="1200" b="1"/>
               <a:t>#</a:t>
             </a:r>
             <a:r>
-              <a:rPr lang="en-SG" sz="1000"/>
+              <a:rPr lang="en-SG" sz="1200"/>
               <a:t> </a:t>
             </a:r>
             <a:r>
-              <a:rPr lang="en-SG" sz="1000" b="1"/>
+              <a:rPr lang="en-SG" sz="1200" b="1"/>
               <a:t>CLIENT_ID</a:t>
             </a:r>
             <a:r>
-              <a:rPr lang="en-SG" sz="1000"/>
+              <a:rPr lang="en-SG" sz="1200"/>
               <a:t>: String = "591065149112-69ikmid17q2trahg28gip4o8srmo47pv.apps.googleusercontent.com"</a:t>
             </a:r>
           </a:p>
           <a:p>
             <a:r>
-              <a:rPr lang="en-SG" sz="1000"/>
+              <a:rPr lang="en-SG" sz="1200"/>
               <a:t>- </a:t>
             </a:r>
             <a:r>
-              <a:rPr lang="en-SG" sz="1000" b="1"/>
+              <a:rPr lang="en-SG" sz="1200" b="1"/>
               <a:t>SERVICE_SOURCE</a:t>
             </a:r>
             <a:r>
-              <a:rPr lang="en-SG" sz="1000"/>
+              <a:rPr lang="en-SG" sz="1200"/>
               <a:t>: String = “GOOGLE”</a:t>
             </a:r>
           </a:p>
           <a:p>
             <a:r>
-              <a:rPr lang="en-SG" sz="1000" b="1"/>
+              <a:rPr lang="en-SG" sz="1200" b="1"/>
               <a:t>#</a:t>
             </a:r>
             <a:r>
-              <a:rPr lang="en-SG" sz="1000"/>
+              <a:rPr lang="en-SG" sz="1200"/>
               <a:t> </a:t>
             </a:r>
             <a:r>
-              <a:rPr lang="en-SG" sz="1000" b="1"/>
+              <a:rPr lang="en-SG" sz="1200" b="1"/>
               <a:t>accessScope</a:t>
             </a:r>
             <a:r>
-              <a:rPr lang="en-SG" sz="1000"/>
+              <a:rPr lang="en-SG" sz="1200"/>
               <a:t>: String</a:t>
             </a:r>
           </a:p>
           <a:p>
             <a:r>
-              <a:rPr lang="en-SG" sz="1000" b="1"/>
+              <a:rPr lang="en-SG" sz="1200" b="1"/>
               <a:t>#</a:t>
             </a:r>
             <a:r>
-              <a:rPr lang="en-SG" sz="1000"/>
+              <a:rPr lang="en-SG" sz="1200"/>
               <a:t> </a:t>
             </a:r>
             <a:r>
-              <a:rPr lang="en-SG" sz="1000" b="1"/>
+              <a:rPr lang="en-SG" sz="1200" b="1"/>
               <a:t>authToken</a:t>
             </a:r>
             <a:r>
-              <a:rPr lang="en-SG" sz="1000"/>
+              <a:rPr lang="en-SG" sz="1200"/>
               <a:t>: TokenResponse</a:t>
             </a:r>
             <a:br>
-              <a:rPr lang="en-SG" sz="1000"/>
+              <a:rPr lang="en-SG" sz="1200"/>
             </a:br>
             <a:r>
-              <a:rPr lang="en-SG" sz="1000" b="1"/>
+              <a:rPr lang="en-SG" sz="1200" b="1"/>
               <a:t>#</a:t>
             </a:r>
             <a:r>
-              <a:rPr lang="en-SG" sz="1000"/>
+              <a:rPr lang="en-SG" sz="1200"/>
               <a:t> </a:t>
             </a:r>
             <a:r>
-              <a:rPr lang="en-SG" sz="1000" b="1"/>
+              <a:rPr lang="en-SG" sz="1200" b="1"/>
               <a:t>credential</a:t>
             </a:r>
             <a:r>
-              <a:rPr lang="en-SG" sz="1000"/>
+              <a:rPr lang="en-SG" sz="1200"/>
               <a:t>: GoogleCredential</a:t>
             </a:r>
             <a:br>
-              <a:rPr lang="en-SG" sz="1000"/>
+              <a:rPr lang="en-SG" sz="1200"/>
             </a:br>
             <a:r>
-              <a:rPr lang="en-SG" sz="1000" b="1"/>
+              <a:rPr lang="en-SG" sz="1200" b="1"/>
               <a:t>#</a:t>
             </a:r>
             <a:r>
-              <a:rPr lang="en-SG" sz="1000"/>
+              <a:rPr lang="en-SG" sz="1200"/>
               <a:t> </a:t>
             </a:r>
             <a:r>
-              <a:rPr lang="en-SG" sz="1000" b="1"/>
+              <a:rPr lang="en-SG" sz="1200" b="1"/>
               <a:t>httpTransport</a:t>
             </a:r>
             <a:r>
-              <a:rPr lang="en-SG" sz="1000"/>
+              <a:rPr lang="en-SG" sz="1200"/>
               <a:t>: HttpTransport</a:t>
             </a:r>
             <a:br>
-              <a:rPr lang="en-SG" sz="1000"/>
+              <a:rPr lang="en-SG" sz="1200"/>
             </a:br>
             <a:r>
-              <a:rPr lang="en-SG" sz="1000" b="1"/>
+              <a:rPr lang="en-SG" sz="1200" b="1"/>
               <a:t>#</a:t>
             </a:r>
             <a:r>
-              <a:rPr lang="en-SG" sz="1000"/>
+              <a:rPr lang="en-SG" sz="1200"/>
               <a:t> </a:t>
             </a:r>
             <a:r>
-              <a:rPr lang="en-SG" sz="1000" b="1"/>
+              <a:rPr lang="en-SG" sz="1200" b="1"/>
               <a:t>jsonFactory</a:t>
             </a:r>
             <a:r>
-              <a:rPr lang="en-SG" sz="1000"/>
+              <a:rPr lang="en-SG" sz="1200"/>
               <a:t>: JacksonFactory</a:t>
             </a:r>
           </a:p>
           <a:p>
-            <a:endParaRPr lang="en-SG" sz="1000"/>
-          </a:p>
-          <a:p>
-            <a:r>
-              <a:rPr lang="en-SG" sz="1000" b="1"/>
+            <a:endParaRPr lang="en-SG" sz="1200"/>
+          </a:p>
+          <a:p>
+            <a:r>
+              <a:rPr lang="en-SG" sz="1200" b="1"/>
               <a:t>#</a:t>
             </a:r>
             <a:r>
-              <a:rPr lang="en-SG" sz="1000"/>
+              <a:rPr lang="en-SG" sz="1200"/>
               <a:t> </a:t>
             </a:r>
             <a:r>
-              <a:rPr lang="en-SG" sz="1000" b="1"/>
+              <a:rPr lang="en-SG" sz="1200" b="1"/>
               <a:t>setupCredentials(</a:t>
             </a:r>
             <a:r>
-              <a:rPr lang="en-SG" sz="1000"/>
+              <a:rPr lang="en-SG" sz="1200"/>
               <a:t>String</a:t>
             </a:r>
             <a:r>
-              <a:rPr lang="en-SG" sz="1000" b="1"/>
+              <a:rPr lang="en-SG" sz="1200" b="1"/>
               <a:t>)</a:t>
             </a:r>
             <a:r>
-              <a:rPr lang="en-SG" sz="1000"/>
+              <a:rPr lang="en-SG" sz="1200"/>
               <a:t>: void</a:t>
             </a:r>
           </a:p>
@@ -3848,8 +3853,8 @@
         </p:nvCxnSpPr>
         <p:spPr>
           <a:xfrm>
-            <a:off x="5689166" y="1680396"/>
-            <a:ext cx="276395" cy="0"/>
+            <a:off x="5638897" y="1466437"/>
+            <a:ext cx="390191" cy="0"/>
           </a:xfrm>
           <a:prstGeom prst="line">
             <a:avLst/>
@@ -3889,7 +3894,7 @@
         </p:nvSpPr>
         <p:spPr>
           <a:xfrm>
-            <a:off x="8710263" y="2649892"/>
+            <a:off x="8837325" y="2754641"/>
             <a:ext cx="215830" cy="149193"/>
           </a:xfrm>
           <a:prstGeom prst="triangle">
@@ -3925,7 +3930,7 @@
           <a:lstStyle/>
           <a:p>
             <a:pPr algn="ctr"/>
-            <a:endParaRPr lang="en-SG"/>
+            <a:endParaRPr lang="en-SG" sz="2800"/>
           </a:p>
         </p:txBody>
       </p:sp>
@@ -3946,7 +3951,7 @@
         </p:nvCxnSpPr>
         <p:spPr>
           <a:xfrm>
-            <a:off x="8818178" y="2799085"/>
+            <a:off x="8945240" y="2903834"/>
             <a:ext cx="0" cy="193260"/>
           </a:xfrm>
           <a:prstGeom prst="line">
@@ -3983,7 +3988,7 @@
         </p:nvCxnSpPr>
         <p:spPr>
           <a:xfrm flipH="1">
-            <a:off x="5827364" y="2992345"/>
+            <a:off x="5954426" y="3097094"/>
             <a:ext cx="2990814" cy="0"/>
           </a:xfrm>
           <a:prstGeom prst="line">
@@ -4019,13 +4024,15 @@
               </a:ext>
             </a:extLst>
           </p:cNvPr>
-          <p:cNvCxnSpPr/>
+          <p:cNvCxnSpPr>
+            <a:cxnSpLocks/>
+          </p:cNvCxnSpPr>
           <p:nvPr/>
         </p:nvCxnSpPr>
         <p:spPr>
           <a:xfrm>
-            <a:off x="5827364" y="2992345"/>
-            <a:ext cx="0" cy="251647"/>
+            <a:off x="5960811" y="3097094"/>
+            <a:ext cx="0" cy="314187"/>
           </a:xfrm>
           <a:prstGeom prst="line">
             <a:avLst/>
@@ -4067,7 +4074,7 @@
         </p:nvCxnSpPr>
         <p:spPr>
           <a:xfrm flipH="1">
-            <a:off x="3209172" y="3243992"/>
+            <a:off x="3342619" y="3411281"/>
             <a:ext cx="2618194" cy="0"/>
           </a:xfrm>
           <a:prstGeom prst="line">
@@ -4110,8 +4117,8 @@
         </p:nvCxnSpPr>
         <p:spPr>
           <a:xfrm>
-            <a:off x="5827364" y="3243992"/>
-            <a:ext cx="3388989" cy="0"/>
+            <a:off x="5960811" y="3411281"/>
+            <a:ext cx="3211200" cy="0"/>
           </a:xfrm>
           <a:prstGeom prst="line">
             <a:avLst/>
@@ -4154,7 +4161,7 @@
         </p:nvCxnSpPr>
         <p:spPr>
           <a:xfrm>
-            <a:off x="3209172" y="3243992"/>
+            <a:off x="3339977" y="3403218"/>
             <a:ext cx="1" cy="283740"/>
           </a:xfrm>
           <a:prstGeom prst="line">
@@ -4198,8 +4205,8 @@
         </p:nvCxnSpPr>
         <p:spPr>
           <a:xfrm>
-            <a:off x="9216353" y="3243992"/>
-            <a:ext cx="5284" cy="283740"/>
+            <a:off x="9166681" y="3411281"/>
+            <a:ext cx="5284" cy="176033"/>
           </a:xfrm>
           <a:prstGeom prst="line">
             <a:avLst/>
@@ -4239,8 +4246,8 @@
         </p:nvSpPr>
         <p:spPr>
           <a:xfrm>
-            <a:off x="760015" y="3527732"/>
-            <a:ext cx="4898315" cy="1785104"/>
+            <a:off x="890820" y="3686958"/>
+            <a:ext cx="4898315" cy="2523768"/>
           </a:xfrm>
           <a:prstGeom prst="rect">
             <a:avLst/>
@@ -4264,110 +4271,110 @@
           <a:p>
             <a:pPr algn="ctr"/>
             <a:r>
-              <a:rPr lang="en-SG" sz="1000" b="1"/>
+              <a:rPr lang="en-SG" sz="1400" b="1"/>
               <a:t>ImportCommand</a:t>
             </a:r>
           </a:p>
           <a:p>
             <a:pPr algn="ctr"/>
-            <a:endParaRPr lang="en-SG" sz="1000" b="1"/>
-          </a:p>
-          <a:p>
-            <a:r>
-              <a:rPr lang="en-SG" sz="1000" b="1"/>
+            <a:endParaRPr lang="en-SG" sz="1200" b="1"/>
+          </a:p>
+          <a:p>
+            <a:r>
+              <a:rPr lang="en-SG" sz="1200" b="1"/>
               <a:t>+ COMMAND_WORD</a:t>
             </a:r>
             <a:r>
-              <a:rPr lang="en-SG" sz="1000"/>
+              <a:rPr lang="en-SG" sz="1200"/>
               <a:t>: String = “import”</a:t>
             </a:r>
           </a:p>
           <a:p>
             <a:r>
-              <a:rPr lang="en-SG" sz="1000" b="1"/>
+              <a:rPr lang="en-SG" sz="1200" b="1"/>
               <a:t>+ ACCESS_SCOPE</a:t>
             </a:r>
             <a:r>
-              <a:rPr lang="en-SG" sz="1000"/>
+              <a:rPr lang="en-SG" sz="1200"/>
               <a:t>: String = “https://www.googleapis.com/auth/contacts.readonly”</a:t>
             </a:r>
           </a:p>
           <a:p>
             <a:r>
-              <a:rPr lang="en-SG" sz="1000" b="1"/>
+              <a:rPr lang="en-SG" sz="1200" b="1"/>
               <a:t># peopleService</a:t>
             </a:r>
             <a:r>
-              <a:rPr lang="en-SG" sz="1000"/>
+              <a:rPr lang="en-SG" sz="1200"/>
               <a:t>: PeopleService</a:t>
             </a:r>
           </a:p>
           <a:p>
-            <a:endParaRPr lang="en-SG" sz="1000" b="1"/>
-          </a:p>
-          <a:p>
-            <a:r>
-              <a:rPr lang="en-SG" sz="1000" b="1"/>
+            <a:endParaRPr lang="en-SG" sz="1200" b="1"/>
+          </a:p>
+          <a:p>
+            <a:r>
+              <a:rPr lang="en-SG" sz="1200" b="1"/>
               <a:t>+</a:t>
             </a:r>
             <a:r>
-              <a:rPr lang="en-SG" sz="1000"/>
+              <a:rPr lang="en-SG" sz="1200"/>
               <a:t> </a:t>
             </a:r>
             <a:r>
-              <a:rPr lang="en-SG" sz="1000" b="1"/>
+              <a:rPr lang="en-SG" sz="1200" b="1"/>
               <a:t>execute(): </a:t>
             </a:r>
             <a:r>
-              <a:rPr lang="en-SG" sz="1000"/>
+              <a:rPr lang="en-SG" sz="1200"/>
               <a:t>CommandResult</a:t>
             </a:r>
           </a:p>
           <a:p>
             <a:r>
-              <a:rPr lang="en-SG" sz="1000" b="1"/>
+              <a:rPr lang="en-SG" sz="1200" b="1"/>
               <a:t>+ getAuthenticationUrl(): </a:t>
             </a:r>
             <a:r>
-              <a:rPr lang="en-SG" sz="1000"/>
+              <a:rPr lang="en-SG" sz="1200"/>
               <a:t>String</a:t>
             </a:r>
           </a:p>
           <a:p>
             <a:r>
-              <a:rPr lang="en-SG" sz="1000" b="1"/>
+              <a:rPr lang="en-SG" sz="1200" b="1"/>
               <a:t>+ getAccessScope(): </a:t>
             </a:r>
             <a:r>
-              <a:rPr lang="en-SG" sz="1000"/>
+              <a:rPr lang="en-SG" sz="1200"/>
               <a:t>String</a:t>
             </a:r>
           </a:p>
           <a:p>
             <a:r>
-              <a:rPr lang="en-SG" sz="1000" b="1"/>
+              <a:rPr lang="en-SG" sz="1200" b="1"/>
               <a:t># handleAuthenticationSuccessEvent(</a:t>
             </a:r>
             <a:r>
-              <a:rPr lang="en-SG" sz="1000"/>
+              <a:rPr lang="en-SG" sz="1200"/>
               <a:t>GoogleAuthenticationSuccessEvent</a:t>
             </a:r>
             <a:r>
-              <a:rPr lang="en-SG" sz="1000" b="1"/>
+              <a:rPr lang="en-SG" sz="1200" b="1"/>
               <a:t>)</a:t>
             </a:r>
             <a:r>
-              <a:rPr lang="en-SG" sz="1000"/>
+              <a:rPr lang="en-SG" sz="1200"/>
               <a:t>: void</a:t>
             </a:r>
           </a:p>
           <a:p>
             <a:r>
-              <a:rPr lang="en-SG" sz="1000" b="1"/>
+              <a:rPr lang="en-SG" sz="1200" b="1"/>
               <a:t>- commandTypeCheck()</a:t>
             </a:r>
             <a:r>
-              <a:rPr lang="en-SG" sz="1000"/>
+              <a:rPr lang="en-SG" sz="1200"/>
               <a:t>:boolean</a:t>
             </a:r>
           </a:p>
@@ -4387,8 +4394,8 @@
         </p:nvSpPr>
         <p:spPr>
           <a:xfrm>
-            <a:off x="6772479" y="3527732"/>
-            <a:ext cx="4898315" cy="2246769"/>
+            <a:off x="6722807" y="3587314"/>
+            <a:ext cx="4898315" cy="3077766"/>
           </a:xfrm>
           <a:prstGeom prst="rect">
             <a:avLst/>
@@ -4412,160 +4419,160 @@
           <a:p>
             <a:pPr algn="ctr"/>
             <a:r>
-              <a:rPr lang="en-SG" sz="1000" b="1"/>
+              <a:rPr lang="en-SG" sz="1400" b="1"/>
               <a:t>ExportCommand</a:t>
             </a:r>
           </a:p>
           <a:p>
             <a:pPr algn="ctr"/>
-            <a:endParaRPr lang="en-SG" sz="1000" b="1"/>
-          </a:p>
-          <a:p>
-            <a:r>
-              <a:rPr lang="en-SG" sz="1000" b="1"/>
+            <a:endParaRPr lang="en-SG" sz="1200" b="1"/>
+          </a:p>
+          <a:p>
+            <a:r>
+              <a:rPr lang="en-SG" sz="1200" b="1"/>
               <a:t>+ COMMAND_WORD</a:t>
             </a:r>
             <a:r>
-              <a:rPr lang="en-SG" sz="1000"/>
+              <a:rPr lang="en-SG" sz="1200"/>
               <a:t>: String = “export”</a:t>
             </a:r>
           </a:p>
           <a:p>
             <a:r>
-              <a:rPr lang="en-SG" sz="1000" b="1"/>
+              <a:rPr lang="en-SG" sz="1200" b="1"/>
               <a:t>+ ACCESS_SCOPE</a:t>
             </a:r>
             <a:r>
-              <a:rPr lang="en-SG" sz="1000"/>
+              <a:rPr lang="en-SG" sz="1200"/>
               <a:t>: String = “https://www.googleapis.com/auth/contacts”</a:t>
             </a:r>
           </a:p>
           <a:p>
             <a:r>
-              <a:rPr lang="en-SG" sz="1000" b="1"/>
+              <a:rPr lang="en-SG" sz="1200" b="1"/>
               <a:t>- GOOGLE_CONTACTS_GROUP_VIEW</a:t>
             </a:r>
             <a:r>
-              <a:rPr lang="en-SG" sz="1000"/>
+              <a:rPr lang="en-SG" sz="1200"/>
               <a:t>: String = “https://contacts.google.com/label/</a:t>
             </a:r>
             <a:r>
-              <a:rPr lang="en-SG" sz="1000" b="1"/>
+              <a:rPr lang="en-SG" sz="1200" b="1"/>
               <a:t>”</a:t>
             </a:r>
           </a:p>
           <a:p>
             <a:r>
-              <a:rPr lang="en-SG" sz="1000" b="1"/>
-              <a:t># </a:t>
-            </a:r>
-            <a:r>
-              <a:rPr lang="en-SG" sz="1000"/>
-              <a:t>peopleService: PeopleService</a:t>
-            </a:r>
-          </a:p>
-          <a:p>
-            <a:endParaRPr lang="en-SG" sz="1000" b="1"/>
-          </a:p>
-          <a:p>
-            <a:r>
-              <a:rPr lang="en-SG" sz="1000" b="1"/>
+              <a:rPr lang="en-SG" sz="1200" b="1"/>
+              <a:t># peopleService</a:t>
+            </a:r>
+            <a:r>
+              <a:rPr lang="en-SG" sz="1200"/>
+              <a:t>: PeopleService</a:t>
+            </a:r>
+          </a:p>
+          <a:p>
+            <a:endParaRPr lang="en-SG" sz="1200" b="1"/>
+          </a:p>
+          <a:p>
+            <a:r>
+              <a:rPr lang="en-SG" sz="1200" b="1"/>
               <a:t>+ execute()</a:t>
             </a:r>
             <a:r>
-              <a:rPr lang="en-SG" sz="1000"/>
+              <a:rPr lang="en-SG" sz="1200"/>
               <a:t>: CommandResult</a:t>
             </a:r>
           </a:p>
           <a:p>
             <a:r>
-              <a:rPr lang="en-SG" sz="1000" b="1"/>
+              <a:rPr lang="en-SG" sz="1200" b="1"/>
               <a:t>+ getAuthenticationUrl()</a:t>
             </a:r>
             <a:r>
-              <a:rPr lang="en-SG" sz="1000"/>
+              <a:rPr lang="en-SG" sz="1200"/>
               <a:t>:</a:t>
             </a:r>
             <a:r>
-              <a:rPr lang="en-SG" sz="1000" b="1"/>
+              <a:rPr lang="en-SG" sz="1200" b="1"/>
               <a:t> </a:t>
             </a:r>
             <a:r>
-              <a:rPr lang="en-SG" sz="1000"/>
+              <a:rPr lang="en-SG" sz="1200"/>
               <a:t>String</a:t>
             </a:r>
           </a:p>
           <a:p>
             <a:r>
-              <a:rPr lang="en-SG" sz="1000" b="1"/>
+              <a:rPr lang="en-SG" sz="1200" b="1"/>
               <a:t>+ getAccessScope()</a:t>
             </a:r>
             <a:r>
-              <a:rPr lang="en-SG" sz="1000"/>
+              <a:rPr lang="en-SG" sz="1200"/>
               <a:t>:</a:t>
             </a:r>
             <a:r>
-              <a:rPr lang="en-SG" sz="1000" b="1"/>
+              <a:rPr lang="en-SG" sz="1200" b="1"/>
               <a:t> </a:t>
             </a:r>
             <a:r>
-              <a:rPr lang="en-SG" sz="1000"/>
+              <a:rPr lang="en-SG" sz="1200"/>
               <a:t>String</a:t>
             </a:r>
           </a:p>
           <a:p>
             <a:r>
-              <a:rPr lang="en-SG" sz="1000" b="1"/>
+              <a:rPr lang="en-SG" sz="1200" b="1"/>
               <a:t># handleAuthenticationSuccessEvent(</a:t>
             </a:r>
             <a:r>
-              <a:rPr lang="en-SG" sz="1000"/>
+              <a:rPr lang="en-SG" sz="1200"/>
               <a:t>GoogleAuthenticationSuccessEvent</a:t>
             </a:r>
             <a:r>
-              <a:rPr lang="en-SG" sz="1000" b="1"/>
+              <a:rPr lang="en-SG" sz="1200" b="1"/>
               <a:t>)</a:t>
             </a:r>
             <a:r>
-              <a:rPr lang="en-SG" sz="1000"/>
+              <a:rPr lang="en-SG" sz="1200"/>
               <a:t>: void</a:t>
             </a:r>
           </a:p>
           <a:p>
             <a:r>
-              <a:rPr lang="en-SG" sz="1000" b="1"/>
+              <a:rPr lang="en-SG" sz="1200" b="1"/>
               <a:t>- createNewContactGroup()</a:t>
             </a:r>
             <a:r>
-              <a:rPr lang="en-SG" sz="1000"/>
+              <a:rPr lang="en-SG" sz="1200"/>
               <a:t>:</a:t>
             </a:r>
             <a:r>
-              <a:rPr lang="en-SG" sz="1000" b="1"/>
+              <a:rPr lang="en-SG" sz="1200" b="1"/>
               <a:t> </a:t>
             </a:r>
             <a:r>
-              <a:rPr lang="en-SG" sz="1000"/>
+              <a:rPr lang="en-SG" sz="1200"/>
               <a:t>String</a:t>
             </a:r>
           </a:p>
           <a:p>
             <a:r>
-              <a:rPr lang="en-SG" sz="1000" b="1"/>
+              <a:rPr lang="en-SG" sz="1200" b="1"/>
               <a:t>- retrieveExistingContactGroupResourceName()</a:t>
             </a:r>
             <a:r>
-              <a:rPr lang="en-SG" sz="1000"/>
+              <a:rPr lang="en-SG" sz="1200"/>
               <a:t>: String</a:t>
             </a:r>
           </a:p>
           <a:p>
             <a:r>
-              <a:rPr lang="en-SG" sz="1000" b="1"/>
+              <a:rPr lang="en-SG" sz="1200" b="1"/>
               <a:t>- commandTypeCheck()</a:t>
             </a:r>
             <a:r>
-              <a:rPr lang="en-SG" sz="1000"/>
+              <a:rPr lang="en-SG" sz="1200"/>
               <a:t>: boolean</a:t>
             </a:r>
           </a:p>
@@ -4587,8 +4594,8 @@
         </p:nvCxnSpPr>
         <p:spPr>
           <a:xfrm>
-            <a:off x="641657" y="1837008"/>
-            <a:ext cx="4898315" cy="0"/>
+            <a:off x="523017" y="1672992"/>
+            <a:ext cx="4971801" cy="0"/>
           </a:xfrm>
           <a:prstGeom prst="line">
             <a:avLst/>
@@ -4630,8 +4637,8 @@
         </p:nvCxnSpPr>
         <p:spPr>
           <a:xfrm>
-            <a:off x="641657" y="1219387"/>
-            <a:ext cx="4898315" cy="0"/>
+            <a:off x="523017" y="774192"/>
+            <a:ext cx="4971801" cy="0"/>
           </a:xfrm>
           <a:prstGeom prst="line">
             <a:avLst/>
@@ -4673,7 +4680,7 @@
         </p:nvCxnSpPr>
         <p:spPr>
           <a:xfrm>
-            <a:off x="5965560" y="1123134"/>
+            <a:off x="6029087" y="696686"/>
             <a:ext cx="5706000" cy="0"/>
           </a:xfrm>
           <a:prstGeom prst="line">
@@ -4716,7 +4723,7 @@
         </p:nvCxnSpPr>
         <p:spPr>
           <a:xfrm>
-            <a:off x="5965560" y="2357885"/>
+            <a:off x="6029087" y="2357565"/>
             <a:ext cx="5706000" cy="0"/>
           </a:xfrm>
           <a:prstGeom prst="line">
@@ -4759,7 +4766,7 @@
         </p:nvCxnSpPr>
         <p:spPr>
           <a:xfrm>
-            <a:off x="760015" y="3825738"/>
+            <a:off x="890820" y="3984964"/>
             <a:ext cx="4898315" cy="0"/>
           </a:xfrm>
           <a:prstGeom prst="line">
@@ -4802,7 +4809,7 @@
         </p:nvCxnSpPr>
         <p:spPr>
           <a:xfrm>
-            <a:off x="760015" y="4441559"/>
+            <a:off x="890819" y="4964769"/>
             <a:ext cx="4898315" cy="0"/>
           </a:xfrm>
           <a:prstGeom prst="line">
@@ -4845,7 +4852,7 @@
         </p:nvCxnSpPr>
         <p:spPr>
           <a:xfrm>
-            <a:off x="6772479" y="3816593"/>
+            <a:off x="6722807" y="3871054"/>
             <a:ext cx="4898315" cy="0"/>
           </a:xfrm>
           <a:prstGeom prst="line">
@@ -4888,7 +4895,7 @@
         </p:nvCxnSpPr>
         <p:spPr>
           <a:xfrm>
-            <a:off x="6772479" y="4572187"/>
+            <a:off x="6717523" y="5042704"/>
             <a:ext cx="4898315" cy="0"/>
           </a:xfrm>
           <a:prstGeom prst="line">

</xml_diff>